<commit_message>
Update DG pictures to be consistent in Add Edit Delete List
</commit_message>
<xml_diff>
--- a/docs/diagrams/LogicCommandBondPackage.pptx
+++ b/docs/diagrams/LogicCommandBondPackage.pptx
@@ -104,6 +104,11 @@
       </a:defRPr>
     </a:lvl9pPr>
   </p:defaultTextStyle>
+  <p:extLst>
+    <p:ext uri="{EFAFB233-063F-42B5-8137-9DF3F51BA10A}">
+      <p15:sldGuideLst xmlns:p15="http://schemas.microsoft.com/office/powerpoint/2012/main"/>
+    </p:ext>
+  </p:extLst>
 </p:presentation>
 </file>
 
@@ -256,7 +261,7 @@
           <a:p>
             <a:fld id="{0664A5E6-A9E0-3C4B-8245-724848CC6E69}" type="datetimeFigureOut">
               <a:rPr lang="en-US" smtClean="0"/>
-              <a:t>10/22/19</a:t>
+              <a:t>10/24/2019</a:t>
             </a:fld>
             <a:endParaRPr lang="en-US"/>
           </a:p>
@@ -456,7 +461,7 @@
           <a:p>
             <a:fld id="{0664A5E6-A9E0-3C4B-8245-724848CC6E69}" type="datetimeFigureOut">
               <a:rPr lang="en-US" smtClean="0"/>
-              <a:t>10/22/19</a:t>
+              <a:t>10/24/2019</a:t>
             </a:fld>
             <a:endParaRPr lang="en-US"/>
           </a:p>
@@ -666,7 +671,7 @@
           <a:p>
             <a:fld id="{0664A5E6-A9E0-3C4B-8245-724848CC6E69}" type="datetimeFigureOut">
               <a:rPr lang="en-US" smtClean="0"/>
-              <a:t>10/22/19</a:t>
+              <a:t>10/24/2019</a:t>
             </a:fld>
             <a:endParaRPr lang="en-US"/>
           </a:p>
@@ -866,7 +871,7 @@
           <a:p>
             <a:fld id="{0664A5E6-A9E0-3C4B-8245-724848CC6E69}" type="datetimeFigureOut">
               <a:rPr lang="en-US" smtClean="0"/>
-              <a:t>10/22/19</a:t>
+              <a:t>10/24/2019</a:t>
             </a:fld>
             <a:endParaRPr lang="en-US"/>
           </a:p>
@@ -1142,7 +1147,7 @@
           <a:p>
             <a:fld id="{0664A5E6-A9E0-3C4B-8245-724848CC6E69}" type="datetimeFigureOut">
               <a:rPr lang="en-US" smtClean="0"/>
-              <a:t>10/22/19</a:t>
+              <a:t>10/24/2019</a:t>
             </a:fld>
             <a:endParaRPr lang="en-US"/>
           </a:p>
@@ -1410,7 +1415,7 @@
           <a:p>
             <a:fld id="{0664A5E6-A9E0-3C4B-8245-724848CC6E69}" type="datetimeFigureOut">
               <a:rPr lang="en-US" smtClean="0"/>
-              <a:t>10/22/19</a:t>
+              <a:t>10/24/2019</a:t>
             </a:fld>
             <a:endParaRPr lang="en-US"/>
           </a:p>
@@ -1825,7 +1830,7 @@
           <a:p>
             <a:fld id="{0664A5E6-A9E0-3C4B-8245-724848CC6E69}" type="datetimeFigureOut">
               <a:rPr lang="en-US" smtClean="0"/>
-              <a:t>10/22/19</a:t>
+              <a:t>10/24/2019</a:t>
             </a:fld>
             <a:endParaRPr lang="en-US"/>
           </a:p>
@@ -1967,7 +1972,7 @@
           <a:p>
             <a:fld id="{0664A5E6-A9E0-3C4B-8245-724848CC6E69}" type="datetimeFigureOut">
               <a:rPr lang="en-US" smtClean="0"/>
-              <a:t>10/22/19</a:t>
+              <a:t>10/24/2019</a:t>
             </a:fld>
             <a:endParaRPr lang="en-US"/>
           </a:p>
@@ -2080,7 +2085,7 @@
           <a:p>
             <a:fld id="{0664A5E6-A9E0-3C4B-8245-724848CC6E69}" type="datetimeFigureOut">
               <a:rPr lang="en-US" smtClean="0"/>
-              <a:t>10/22/19</a:t>
+              <a:t>10/24/2019</a:t>
             </a:fld>
             <a:endParaRPr lang="en-US"/>
           </a:p>
@@ -2393,7 +2398,7 @@
           <a:p>
             <a:fld id="{0664A5E6-A9E0-3C4B-8245-724848CC6E69}" type="datetimeFigureOut">
               <a:rPr lang="en-US" smtClean="0"/>
-              <a:t>10/22/19</a:t>
+              <a:t>10/24/2019</a:t>
             </a:fld>
             <a:endParaRPr lang="en-US"/>
           </a:p>
@@ -2682,7 +2687,7 @@
           <a:p>
             <a:fld id="{0664A5E6-A9E0-3C4B-8245-724848CC6E69}" type="datetimeFigureOut">
               <a:rPr lang="en-US" smtClean="0"/>
-              <a:t>10/22/19</a:t>
+              <a:t>10/24/2019</a:t>
             </a:fld>
             <a:endParaRPr lang="en-US"/>
           </a:p>
@@ -2925,7 +2930,7 @@
           <a:p>
             <a:fld id="{0664A5E6-A9E0-3C4B-8245-724848CC6E69}" type="datetimeFigureOut">
               <a:rPr lang="en-US" smtClean="0"/>
-              <a:t>10/22/19</a:t>
+              <a:t>10/24/2019</a:t>
             </a:fld>
             <a:endParaRPr lang="en-US"/>
           </a:p>
@@ -3376,7 +3381,7 @@
           </p:nvSpPr>
           <p:spPr>
             <a:xfrm>
-              <a:off x="1245599" y="283938"/>
+              <a:off x="1245599" y="292903"/>
               <a:ext cx="10563167" cy="5590979"/>
             </a:xfrm>
             <a:prstGeom prst="roundRect">
@@ -3750,7 +3755,7 @@
           </p:nvSpPr>
           <p:spPr>
             <a:xfrm>
-              <a:off x="4430940" y="2631613"/>
+              <a:off x="6785800" y="2610170"/>
               <a:ext cx="1982688" cy="369332"/>
             </a:xfrm>
             <a:prstGeom prst="roundRect">
@@ -3789,7 +3794,7 @@
             <a:p>
               <a:pPr algn="ctr"/>
               <a:r>
-                <a:rPr lang="en-US" sz="1300" err="1">
+                <a:rPr lang="en-US" sz="1300" dirty="0" err="1">
                   <a:solidFill>
                     <a:schemeClr val="tx1"/>
                   </a:solidFill>
@@ -3798,7 +3803,7 @@
                 </a:rPr>
                 <a:t>DeleteBondCommand</a:t>
               </a:r>
-              <a:endParaRPr lang="en-US" sz="1300">
+              <a:endParaRPr lang="en-US" sz="1300" dirty="0">
                 <a:solidFill>
                   <a:schemeClr val="tx1"/>
                 </a:solidFill>
@@ -3822,7 +3827,7 @@
           </p:nvSpPr>
           <p:spPr>
             <a:xfrm>
-              <a:off x="6777900" y="2628272"/>
+              <a:off x="4430940" y="2610171"/>
               <a:ext cx="1982688" cy="369332"/>
             </a:xfrm>
             <a:prstGeom prst="roundRect">
@@ -4094,8 +4099,8 @@
           </p:nvCxnSpPr>
           <p:spPr>
             <a:xfrm flipV="1">
-              <a:off x="3034684" y="2254470"/>
-              <a:ext cx="0" cy="405581"/>
+              <a:off x="3034684" y="2247003"/>
+              <a:ext cx="1569" cy="413048"/>
             </a:xfrm>
             <a:prstGeom prst="line">
               <a:avLst/>
@@ -4133,8 +4138,8 @@
           </p:nvCxnSpPr>
           <p:spPr>
             <a:xfrm flipV="1">
-              <a:off x="5422284" y="2254470"/>
-              <a:ext cx="0" cy="377143"/>
+              <a:off x="7777144" y="2247003"/>
+              <a:ext cx="0" cy="363167"/>
             </a:xfrm>
             <a:prstGeom prst="line">
               <a:avLst/>
@@ -4172,8 +4177,8 @@
           </p:nvCxnSpPr>
           <p:spPr>
             <a:xfrm flipV="1">
-              <a:off x="7769244" y="2247003"/>
-              <a:ext cx="0" cy="381269"/>
+              <a:off x="5422284" y="2247003"/>
+              <a:ext cx="0" cy="363168"/>
             </a:xfrm>
             <a:prstGeom prst="line">
               <a:avLst/>

</xml_diff>